<commit_message>
Final version of presentation was made
</commit_message>
<xml_diff>
--- a/Course Project.pptx
+++ b/Course Project.pptx
@@ -116,7 +116,7 @@
   </p:defaultTextStyle>
   <p:extLst>
     <p:ext uri="{EFAFB233-063F-42B5-8137-9DF3F51BA10A}">
-      <p15:sldGuideLst xmlns:p15="http://schemas.microsoft.com/office/powerpoint/2012/main">
+      <p15:sldGuideLst xmlns:p15="http://schemas.microsoft.com/office/powerpoint/2012/main" xmlns="">
         <p15:guide id="1" orient="horz" pos="2160">
           <p15:clr>
             <a:srgbClr val="A4A3A4"/>
@@ -3203,22 +3203,30 @@
           </p:cNvPicPr>
           <p:nvPr/>
         </p:nvPicPr>
-        <p:blipFill>
+        <p:blipFill rotWithShape="1">
           <a:blip r:embed="rId2">
             <a:extLst>
+              <a:ext uri="{BEBA8EAE-BF5A-486C-A8C5-ECC9F3942E4B}">
+                <a14:imgProps xmlns:a14="http://schemas.microsoft.com/office/drawing/2010/main">
+                  <a14:imgLayer r:embed="rId3">
+                    <a14:imgEffect>
+                      <a14:sharpenSoften amount="25000"/>
+                    </a14:imgEffect>
+                  </a14:imgLayer>
+                </a14:imgProps>
+              </a:ext>
               <a:ext uri="{28A0092B-C50C-407E-A947-70E740481C1C}">
                 <a14:useLocalDpi xmlns:a14="http://schemas.microsoft.com/office/drawing/2010/main" val="0"/>
               </a:ext>
             </a:extLst>
           </a:blip>
-          <a:stretch>
-            <a:fillRect/>
-          </a:stretch>
+          <a:srcRect b="2576"/>
+          <a:stretch/>
         </p:blipFill>
         <p:spPr>
           <a:xfrm>
-            <a:off x="1043608" y="1268760"/>
-            <a:ext cx="7183078" cy="5395738"/>
+            <a:off x="1439652" y="1556792"/>
+            <a:ext cx="6264696" cy="4584639"/>
           </a:xfrm>
           <a:prstGeom prst="rect">
             <a:avLst/>
@@ -3314,17 +3322,17 @@
           <a:p>
             <a:r>
               <a:rPr lang="ru-RU" dirty="0" smtClean="0"/>
-              <a:t>Всего найдено – 314/322 автомобилей</a:t>
-            </a:r>
+              <a:t>Всего найдено </a:t>
+            </a:r>
+            <a:r>
+              <a:rPr lang="ru-RU" dirty="0" smtClean="0"/>
+              <a:t>314/322 автомобилей. </a:t>
+            </a:r>
+            <a:endParaRPr lang="en-US" dirty="0"/>
+          </a:p>
+          <a:p>
             <a:r>
               <a:rPr lang="ru-RU" dirty="0"/>
-              <a:t> </a:t>
-            </a:r>
-            <a:endParaRPr lang="en-US" dirty="0"/>
-          </a:p>
-          <a:p>
-            <a:r>
-              <a:rPr lang="ru-RU" dirty="0" smtClean="0"/>
               <a:t>Набрано </a:t>
             </a:r>
             <a:r>
@@ -3333,7 +3341,11 @@
             </a:r>
             <a:r>
               <a:rPr lang="ru-RU" dirty="0" smtClean="0"/>
-              <a:t> очков</a:t>
+              <a:t> </a:t>
+            </a:r>
+            <a:r>
+              <a:rPr lang="ru-RU" dirty="0" smtClean="0"/>
+              <a:t>очков</a:t>
             </a:r>
             <a:r>
               <a:rPr lang="en-US" dirty="0" smtClean="0"/>
@@ -3341,7 +3353,11 @@
             </a:r>
             <a:r>
               <a:rPr lang="ru-RU" dirty="0" smtClean="0"/>
-              <a:t>окно - 200мс)</a:t>
+              <a:t>окно </a:t>
+            </a:r>
+            <a:r>
+              <a:rPr lang="ru-RU" dirty="0" smtClean="0"/>
+              <a:t>200мс).</a:t>
             </a:r>
             <a:endParaRPr lang="ru-RU" dirty="0" smtClean="0"/>
           </a:p>
@@ -3795,7 +3811,7 @@
                         <m:dPr>
                           <m:ctrlPr>
                             <a:rPr lang="en-US" b="0" i="1" smtClean="0">
-                              <a:latin typeface="Cambria Math" panose="02040503050406030204" pitchFamily="18" charset="0"/>
+                              <a:latin typeface="Cambria Math"/>
                             </a:rPr>
                           </m:ctrlPr>
                         </m:dPr>
@@ -3902,7 +3918,7 @@
                         <m:sSupPr>
                           <m:ctrlPr>
                             <a:rPr lang="en-US" b="0" i="1" smtClean="0">
-                              <a:latin typeface="Cambria Math" panose="02040503050406030204" pitchFamily="18" charset="0"/>
+                              <a:latin typeface="Cambria Math"/>
                             </a:rPr>
                           </m:ctrlPr>
                         </m:sSupPr>
@@ -3927,7 +3943,7 @@
                         <m:dPr>
                           <m:ctrlPr>
                             <a:rPr lang="en-US" b="0" i="1" smtClean="0">
-                              <a:latin typeface="Cambria Math" panose="02040503050406030204" pitchFamily="18" charset="0"/>
+                              <a:latin typeface="Cambria Math"/>
                             </a:rPr>
                           </m:ctrlPr>
                         </m:dPr>
@@ -4043,7 +4059,7 @@
                         <m:dPr>
                           <m:ctrlPr>
                             <a:rPr lang="en-US" b="0" i="1" smtClean="0">
-                              <a:latin typeface="Cambria Math" panose="02040503050406030204" pitchFamily="18" charset="0"/>
+                              <a:latin typeface="Cambria Math"/>
                             </a:rPr>
                           </m:ctrlPr>
                         </m:dPr>
@@ -4150,7 +4166,7 @@
                         <m:sSupPr>
                           <m:ctrlPr>
                             <a:rPr lang="en-US" b="0" i="1" smtClean="0">
-                              <a:latin typeface="Cambria Math" panose="02040503050406030204" pitchFamily="18" charset="0"/>
+                              <a:latin typeface="Cambria Math"/>
                             </a:rPr>
                           </m:ctrlPr>
                         </m:sSupPr>
@@ -4178,7 +4194,7 @@
                         <m:dPr>
                           <m:ctrlPr>
                             <a:rPr lang="en-US" b="0" i="1" smtClean="0">
-                              <a:latin typeface="Cambria Math" panose="02040503050406030204" pitchFamily="18" charset="0"/>
+                              <a:latin typeface="Cambria Math"/>
                             </a:rPr>
                           </m:ctrlPr>
                         </m:dPr>
@@ -4749,8 +4765,8 @@
           </a:p>
         </p:txBody>
       </p:sp>
-      <mc:AlternateContent xmlns:mc="http://schemas.openxmlformats.org/markup-compatibility/2006">
-        <mc:Choice xmlns:a14="http://schemas.microsoft.com/office/drawing/2010/main" Requires="a14">
+      <mc:AlternateContent xmlns:mc="http://schemas.openxmlformats.org/markup-compatibility/2006" xmlns:a14="http://schemas.microsoft.com/office/drawing/2010/main">
+        <mc:Choice Requires="a14">
           <p:sp>
             <p:nvSpPr>
               <p:cNvPr id="3" name="Объект 2"/>
@@ -4764,7 +4780,7 @@
             <p:spPr/>
             <p:txBody>
               <a:bodyPr>
-                <a:normAutofit fontScale="92500"/>
+                <a:normAutofit lnSpcReduction="10000"/>
               </a:bodyPr>
               <a:lstStyle/>
               <a:p>
@@ -4798,7 +4814,7 @@
                         <m:sSubPr>
                           <m:ctrlPr>
                             <a:rPr lang="ru-RU" sz="2600" i="1">
-                              <a:latin typeface="Cambria Math" panose="02040503050406030204" pitchFamily="18" charset="0"/>
+                              <a:latin typeface="Cambria Math"/>
                             </a:rPr>
                           </m:ctrlPr>
                         </m:sSubPr>
@@ -4829,7 +4845,7 @@
                         <m:dPr>
                           <m:ctrlPr>
                             <a:rPr lang="ru-RU" sz="2600" i="1">
-                              <a:latin typeface="Cambria Math" panose="02040503050406030204" pitchFamily="18" charset="0"/>
+                              <a:latin typeface="Cambria Math"/>
                             </a:rPr>
                           </m:ctrlPr>
                         </m:dPr>
@@ -4858,7 +4874,7 @@
                         <m:sSubPr>
                           <m:ctrlPr>
                             <a:rPr lang="ru-RU" sz="2600" i="1">
-                              <a:latin typeface="Cambria Math" panose="02040503050406030204" pitchFamily="18" charset="0"/>
+                              <a:latin typeface="Cambria Math"/>
                             </a:rPr>
                           </m:ctrlPr>
                         </m:sSubPr>
@@ -4915,7 +4931,7 @@
                           <m:endChr m:val="]"/>
                           <m:ctrlPr>
                             <a:rPr lang="ru-RU" sz="2600" i="1">
-                              <a:latin typeface="Cambria Math" panose="02040503050406030204" pitchFamily="18" charset="0"/>
+                              <a:latin typeface="Cambria Math"/>
                             </a:rPr>
                           </m:ctrlPr>
                         </m:dPr>
@@ -4924,7 +4940,7 @@
                             <m:sSubPr>
                               <m:ctrlPr>
                                 <a:rPr lang="ru-RU" sz="2600" i="1" smtClean="0">
-                                  <a:latin typeface="Cambria Math" panose="02040503050406030204" pitchFamily="18" charset="0"/>
+                                  <a:latin typeface="Cambria Math"/>
                                 </a:rPr>
                               </m:ctrlPr>
                             </m:sSubPr>
@@ -4955,7 +4971,7 @@
                             <m:sSubPr>
                               <m:ctrlPr>
                                 <a:rPr lang="ru-RU" sz="2600" i="1">
-                                  <a:latin typeface="Cambria Math" panose="02040503050406030204" pitchFamily="18" charset="0"/>
+                                  <a:latin typeface="Cambria Math"/>
                                 </a:rPr>
                               </m:ctrlPr>
                             </m:sSubPr>
@@ -5031,7 +5047,7 @@
                         <m:sSubPr>
                           <m:ctrlPr>
                             <a:rPr lang="ru-RU" sz="2600" i="1">
-                              <a:latin typeface="Cambria Math" panose="02040503050406030204" pitchFamily="18" charset="0"/>
+                              <a:latin typeface="Cambria Math"/>
                             </a:rPr>
                           </m:ctrlPr>
                         </m:sSubPr>
@@ -5062,7 +5078,7 @@
                         <m:dPr>
                           <m:ctrlPr>
                             <a:rPr lang="ru-RU" sz="2600" i="1">
-                              <a:latin typeface="Cambria Math" panose="02040503050406030204" pitchFamily="18" charset="0"/>
+                              <a:latin typeface="Cambria Math"/>
                             </a:rPr>
                           </m:ctrlPr>
                         </m:dPr>
@@ -5091,7 +5107,7 @@
                         <m:sSubPr>
                           <m:ctrlPr>
                             <a:rPr lang="ru-RU" sz="2600" i="1">
-                              <a:latin typeface="Cambria Math" panose="02040503050406030204" pitchFamily="18" charset="0"/>
+                              <a:latin typeface="Cambria Math"/>
                             </a:rPr>
                           </m:ctrlPr>
                         </m:sSubPr>
@@ -5148,7 +5164,7 @@
                           <m:endChr m:val="]"/>
                           <m:ctrlPr>
                             <a:rPr lang="ru-RU" sz="2600" i="1">
-                              <a:latin typeface="Cambria Math" panose="02040503050406030204" pitchFamily="18" charset="0"/>
+                              <a:latin typeface="Cambria Math"/>
                             </a:rPr>
                           </m:ctrlPr>
                         </m:dPr>
@@ -5159,7 +5175,7 @@
                               <m:endChr m:val="|"/>
                               <m:ctrlPr>
                                 <a:rPr lang="ru-RU" sz="2600" i="1">
-                                  <a:latin typeface="Cambria Math" panose="02040503050406030204" pitchFamily="18" charset="0"/>
+                                  <a:latin typeface="Cambria Math"/>
                                 </a:rPr>
                               </m:ctrlPr>
                             </m:dPr>
@@ -5168,7 +5184,7 @@
                                 <m:sSubPr>
                                   <m:ctrlPr>
                                     <a:rPr lang="ru-RU" sz="2600" i="1">
-                                      <a:latin typeface="Cambria Math" panose="02040503050406030204" pitchFamily="18" charset="0"/>
+                                      <a:latin typeface="Cambria Math"/>
                                     </a:rPr>
                                   </m:ctrlPr>
                                 </m:sSubPr>
@@ -5199,7 +5215,7 @@
                                 <m:sSubPr>
                                   <m:ctrlPr>
                                     <a:rPr lang="ru-RU" sz="2600" i="1">
-                                      <a:latin typeface="Cambria Math" panose="02040503050406030204" pitchFamily="18" charset="0"/>
+                                      <a:latin typeface="Cambria Math"/>
                                     </a:rPr>
                                   </m:ctrlPr>
                                 </m:sSubPr>
@@ -5232,7 +5248,7 @@
                             <m:sSubPr>
                               <m:ctrlPr>
                                 <a:rPr lang="ru-RU" sz="2600" i="1" smtClean="0">
-                                  <a:latin typeface="Cambria Math" panose="02040503050406030204" pitchFamily="18" charset="0"/>
+                                  <a:latin typeface="Cambria Math"/>
                                 </a:rPr>
                               </m:ctrlPr>
                             </m:sSubPr>
@@ -5306,7 +5322,7 @@
                           <m:endChr m:val="]"/>
                           <m:ctrlPr>
                             <a:rPr lang="ru-RU" sz="2600" i="1">
-                              <a:latin typeface="Cambria Math" panose="02040503050406030204" pitchFamily="18" charset="0"/>
+                              <a:latin typeface="Cambria Math"/>
                             </a:rPr>
                           </m:ctrlPr>
                         </m:dPr>
@@ -5315,7 +5331,7 @@
                             <m:sSubPr>
                               <m:ctrlPr>
                                 <a:rPr lang="ru-RU" sz="2600" i="1">
-                                  <a:latin typeface="Cambria Math" panose="02040503050406030204" pitchFamily="18" charset="0"/>
+                                  <a:latin typeface="Cambria Math"/>
                                 </a:rPr>
                               </m:ctrlPr>
                             </m:sSubPr>
@@ -5346,7 +5362,7 @@
                             <m:sSubPr>
                               <m:ctrlPr>
                                 <a:rPr lang="ru-RU" sz="2600" i="1">
-                                  <a:latin typeface="Cambria Math" panose="02040503050406030204" pitchFamily="18" charset="0"/>
+                                  <a:latin typeface="Cambria Math"/>
                                 </a:rPr>
                               </m:ctrlPr>
                             </m:sSubPr>
@@ -5387,7 +5403,7 @@
                           <m:endChr m:val=""/>
                           <m:ctrlPr>
                             <a:rPr lang="ru-RU" sz="2600" i="1">
-                              <a:latin typeface="Cambria Math" panose="02040503050406030204" pitchFamily="18" charset="0"/>
+                              <a:latin typeface="Cambria Math"/>
                             </a:rPr>
                           </m:ctrlPr>
                         </m:dPr>
@@ -5402,7 +5418,7 @@
                             <m:eqArrPr>
                               <m:ctrlPr>
                                 <a:rPr lang="ru-RU" sz="2600" i="1">
-                                  <a:latin typeface="Cambria Math" panose="02040503050406030204" pitchFamily="18" charset="0"/>
+                                  <a:latin typeface="Cambria Math"/>
                                 </a:rPr>
                               </m:ctrlPr>
                             </m:eqArrPr>
@@ -5411,7 +5427,7 @@
                                 <m:sSubPr>
                                   <m:ctrlPr>
                                     <a:rPr lang="ru-RU" sz="2600" i="1">
-                                      <a:latin typeface="Cambria Math" panose="02040503050406030204" pitchFamily="18" charset="0"/>
+                                      <a:latin typeface="Cambria Math"/>
                                     </a:rPr>
                                   </m:ctrlPr>
                                 </m:sSubPr>
@@ -5450,7 +5466,7 @@
                                   <m:endChr m:val="|"/>
                                   <m:ctrlPr>
                                     <a:rPr lang="en-US" sz="2600" b="0" i="1" smtClean="0">
-                                      <a:latin typeface="Cambria Math" panose="02040503050406030204" pitchFamily="18" charset="0"/>
+                                      <a:latin typeface="Cambria Math"/>
                                     </a:rPr>
                                   </m:ctrlPr>
                                 </m:dPr>
@@ -5459,7 +5475,7 @@
                                     <m:sSubPr>
                                       <m:ctrlPr>
                                         <a:rPr lang="ru-RU" sz="2600" i="1">
-                                          <a:latin typeface="Cambria Math" panose="02040503050406030204" pitchFamily="18" charset="0"/>
+                                          <a:latin typeface="Cambria Math"/>
                                         </a:rPr>
                                       </m:ctrlPr>
                                     </m:sSubPr>
@@ -5490,7 +5506,7 @@
                                     <m:sSubPr>
                                       <m:ctrlPr>
                                         <a:rPr lang="ru-RU" sz="2600" i="1">
-                                          <a:latin typeface="Cambria Math" panose="02040503050406030204" pitchFamily="18" charset="0"/>
+                                          <a:latin typeface="Cambria Math"/>
                                         </a:rPr>
                                       </m:ctrlPr>
                                     </m:sSubPr>
@@ -5529,7 +5545,7 @@
                                 <m:sSubPr>
                                   <m:ctrlPr>
                                     <a:rPr lang="en-US" sz="2600" b="0" i="1" smtClean="0">
-                                      <a:latin typeface="Cambria Math" panose="02040503050406030204" pitchFamily="18" charset="0"/>
+                                      <a:latin typeface="Cambria Math"/>
                                     </a:rPr>
                                   </m:ctrlPr>
                                 </m:sSubPr>
@@ -5554,7 +5570,7 @@
                                 <m:sSubPr>
                                   <m:ctrlPr>
                                     <a:rPr lang="ru-RU" sz="2600" i="1">
-                                      <a:latin typeface="Cambria Math" panose="02040503050406030204" pitchFamily="18" charset="0"/>
+                                      <a:latin typeface="Cambria Math"/>
                                     </a:rPr>
                                   </m:ctrlPr>
                                 </m:sSubPr>
@@ -5587,7 +5603,7 @@
                                 <m:sSubPr>
                                   <m:ctrlPr>
                                     <a:rPr lang="ru-RU" sz="2600" i="1">
-                                      <a:latin typeface="Cambria Math" panose="02040503050406030204" pitchFamily="18" charset="0"/>
+                                      <a:latin typeface="Cambria Math"/>
                                     </a:rPr>
                                   </m:ctrlPr>
                                 </m:sSubPr>
@@ -5678,7 +5694,7 @@
                         <m:sSubPr>
                           <m:ctrlPr>
                             <a:rPr lang="ru-RU" sz="2600" i="1">
-                              <a:latin typeface="Cambria Math" panose="02040503050406030204" pitchFamily="18" charset="0"/>
+                              <a:latin typeface="Cambria Math"/>
                             </a:rPr>
                           </m:ctrlPr>
                         </m:sSubPr>
@@ -5711,7 +5727,7 @@
                           <m:endChr m:val=""/>
                           <m:ctrlPr>
                             <a:rPr lang="ru-RU" sz="2600" i="1">
-                              <a:latin typeface="Cambria Math" panose="02040503050406030204" pitchFamily="18" charset="0"/>
+                              <a:latin typeface="Cambria Math"/>
                             </a:rPr>
                           </m:ctrlPr>
                         </m:dPr>
@@ -5720,7 +5736,7 @@
                             <m:eqArrPr>
                               <m:ctrlPr>
                                 <a:rPr lang="ru-RU" sz="2600" i="1">
-                                  <a:latin typeface="Cambria Math" panose="02040503050406030204" pitchFamily="18" charset="0"/>
+                                  <a:latin typeface="Cambria Math"/>
                                 </a:rPr>
                               </m:ctrlPr>
                             </m:eqArrPr>
@@ -5737,7 +5753,7 @@
                                   <m:endChr m:val="|"/>
                                   <m:ctrlPr>
                                     <a:rPr lang="ru-RU" sz="2600" i="1">
-                                      <a:latin typeface="Cambria Math" panose="02040503050406030204" pitchFamily="18" charset="0"/>
+                                      <a:latin typeface="Cambria Math"/>
                                     </a:rPr>
                                   </m:ctrlPr>
                                 </m:dPr>
@@ -5746,7 +5762,7 @@
                                     <m:sSubPr>
                                       <m:ctrlPr>
                                         <a:rPr lang="ru-RU" sz="2600" i="1">
-                                          <a:latin typeface="Cambria Math" panose="02040503050406030204" pitchFamily="18" charset="0"/>
+                                          <a:latin typeface="Cambria Math"/>
                                         </a:rPr>
                                       </m:ctrlPr>
                                     </m:sSubPr>
@@ -5777,7 +5793,7 @@
                                     <m:sSubPr>
                                       <m:ctrlPr>
                                         <a:rPr lang="ru-RU" sz="2600" i="1" smtClean="0">
-                                          <a:latin typeface="Cambria Math" panose="02040503050406030204" pitchFamily="18" charset="0"/>
+                                          <a:latin typeface="Cambria Math"/>
                                         </a:rPr>
                                       </m:ctrlPr>
                                     </m:sSubPr>
@@ -5810,7 +5826,7 @@
                                 <m:sSubPr>
                                   <m:ctrlPr>
                                     <a:rPr lang="ru-RU" sz="2600" i="1">
-                                      <a:latin typeface="Cambria Math" panose="02040503050406030204" pitchFamily="18" charset="0"/>
+                                      <a:latin typeface="Cambria Math"/>
                                     </a:rPr>
                                   </m:ctrlPr>
                                 </m:sSubPr>
@@ -5835,7 +5851,7 @@
                                 <m:sSubPr>
                                   <m:ctrlPr>
                                     <a:rPr lang="ru-RU" sz="2600" i="1">
-                                      <a:latin typeface="Cambria Math" panose="02040503050406030204" pitchFamily="18" charset="0"/>
+                                      <a:latin typeface="Cambria Math"/>
                                     </a:rPr>
                                   </m:ctrlPr>
                                 </m:sSubPr>
@@ -5906,7 +5922,7 @@
                             <m:sSubPr>
                               <m:ctrlPr>
                                 <a:rPr lang="ru-RU" sz="2600" i="1">
-                                  <a:latin typeface="Cambria Math" panose="02040503050406030204" pitchFamily="18" charset="0"/>
+                                  <a:latin typeface="Cambria Math"/>
                                 </a:rPr>
                               </m:ctrlPr>
                             </m:sSubPr>
@@ -5937,7 +5953,7 @@
                             <m:sSubPr>
                               <m:ctrlPr>
                                 <a:rPr lang="ru-RU" sz="2600" i="1">
-                                  <a:latin typeface="Cambria Math" panose="02040503050406030204" pitchFamily="18" charset="0"/>
+                                  <a:latin typeface="Cambria Math"/>
                                 </a:rPr>
                               </m:ctrlPr>
                             </m:sSubPr>
@@ -5983,7 +5999,7 @@
             </p:txBody>
           </p:sp>
         </mc:Choice>
-        <mc:Fallback>
+        <mc:Fallback xmlns="">
           <p:sp>
             <p:nvSpPr>
               <p:cNvPr id="3" name="Объект 2"/>
@@ -6114,8 +6130,8 @@
           </a:p>
         </p:txBody>
       </p:sp>
-      <mc:AlternateContent xmlns:mc="http://schemas.openxmlformats.org/markup-compatibility/2006" xmlns:a14="http://schemas.microsoft.com/office/drawing/2010/main">
-        <mc:Choice Requires="a14">
+      <mc:AlternateContent xmlns:mc="http://schemas.openxmlformats.org/markup-compatibility/2006">
+        <mc:Choice xmlns:a14="http://schemas.microsoft.com/office/drawing/2010/main" Requires="a14">
           <p:sp>
             <p:nvSpPr>
               <p:cNvPr id="3" name="Объект 2"/>
@@ -6133,6 +6149,11 @@
               </a:bodyPr>
               <a:lstStyle/>
               <a:p>
+                <a:pPr>
+                  <a:spcAft>
+                    <a:spcPts val="600"/>
+                  </a:spcAft>
+                </a:pPr>
                 <a:r>
                   <a:rPr lang="ru-RU" sz="2500" b="1" dirty="0" smtClean="0"/>
                   <a:t>Предположение: </a:t>
@@ -6149,7 +6170,7 @@
                         <m:endChr m:val="|"/>
                         <m:ctrlPr>
                           <a:rPr lang="ru-RU" sz="2500" i="1">
-                            <a:latin typeface="Cambria Math" panose="02040503050406030204" pitchFamily="18" charset="0"/>
+                            <a:latin typeface="Cambria Math"/>
                           </a:rPr>
                         </m:ctrlPr>
                       </m:dPr>
@@ -6158,7 +6179,7 @@
                           <m:sSubPr>
                             <m:ctrlPr>
                               <a:rPr lang="ru-RU" sz="2500" i="1">
-                                <a:latin typeface="Cambria Math" panose="02040503050406030204" pitchFamily="18" charset="0"/>
+                                <a:latin typeface="Cambria Math"/>
                               </a:rPr>
                             </m:ctrlPr>
                           </m:sSubPr>
@@ -6189,7 +6210,7 @@
                           <m:sSubPr>
                             <m:ctrlPr>
                               <a:rPr lang="ru-RU" sz="2500" i="1">
-                                <a:latin typeface="Cambria Math" panose="02040503050406030204" pitchFamily="18" charset="0"/>
+                                <a:latin typeface="Cambria Math"/>
                               </a:rPr>
                             </m:ctrlPr>
                           </m:sSubPr>
@@ -6246,7 +6267,7 @@
                       <m:sSubSupPr>
                         <m:ctrlPr>
                           <a:rPr lang="en-US" sz="2600" b="0" i="1" smtClean="0">
-                            <a:latin typeface="Cambria Math" panose="02040503050406030204" pitchFamily="18" charset="0"/>
+                            <a:latin typeface="Cambria Math"/>
                           </a:rPr>
                         </m:ctrlPr>
                       </m:sSubSupPr>
@@ -6287,7 +6308,7 @@
                         <m:endChr m:val=""/>
                         <m:ctrlPr>
                           <a:rPr lang="ru-RU" sz="2600" i="1">
-                            <a:latin typeface="Cambria Math" panose="02040503050406030204" pitchFamily="18" charset="0"/>
+                            <a:latin typeface="Cambria Math"/>
                           </a:rPr>
                         </m:ctrlPr>
                       </m:dPr>
@@ -6302,7 +6323,7 @@
                           <m:eqArrPr>
                             <m:ctrlPr>
                               <a:rPr lang="ru-RU" sz="2600" i="1">
-                                <a:latin typeface="Cambria Math" panose="02040503050406030204" pitchFamily="18" charset="0"/>
+                                <a:latin typeface="Cambria Math"/>
                               </a:rPr>
                             </m:ctrlPr>
                           </m:eqArrPr>
@@ -6311,7 +6332,7 @@
                               <m:sSubPr>
                                 <m:ctrlPr>
                                   <a:rPr lang="ru-RU" sz="2600" i="1">
-                                    <a:latin typeface="Cambria Math" panose="02040503050406030204" pitchFamily="18" charset="0"/>
+                                    <a:latin typeface="Cambria Math"/>
                                   </a:rPr>
                                 </m:ctrlPr>
                               </m:sSubPr>
@@ -6350,7 +6371,7 @@
                                 <m:endChr m:val="|"/>
                                 <m:ctrlPr>
                                   <a:rPr lang="ru-RU" sz="2600" i="1">
-                                    <a:latin typeface="Cambria Math" panose="02040503050406030204" pitchFamily="18" charset="0"/>
+                                    <a:latin typeface="Cambria Math"/>
                                   </a:rPr>
                                 </m:ctrlPr>
                               </m:dPr>
@@ -6359,7 +6380,7 @@
                                   <m:sSubPr>
                                     <m:ctrlPr>
                                       <a:rPr lang="ru-RU" sz="2600" i="1">
-                                        <a:latin typeface="Cambria Math" panose="02040503050406030204" pitchFamily="18" charset="0"/>
+                                        <a:latin typeface="Cambria Math"/>
                                       </a:rPr>
                                     </m:ctrlPr>
                                   </m:sSubPr>
@@ -6390,7 +6411,7 @@
                                   <m:sSubPr>
                                     <m:ctrlPr>
                                       <a:rPr lang="ru-RU" sz="2600" i="1">
-                                        <a:latin typeface="Cambria Math" panose="02040503050406030204" pitchFamily="18" charset="0"/>
+                                        <a:latin typeface="Cambria Math"/>
                                       </a:rPr>
                                     </m:ctrlPr>
                                   </m:sSubPr>
@@ -6468,7 +6489,7 @@
             </p:txBody>
           </p:sp>
         </mc:Choice>
-        <mc:Fallback xmlns="">
+        <mc:Fallback>
           <p:sp>
             <p:nvSpPr>
               <p:cNvPr id="3" name="Объект 2"/>
@@ -6811,10 +6832,6 @@
               <a:rPr lang="ru-RU" dirty="0" smtClean="0"/>
               <a:t>изображения</a:t>
             </a:r>
-            <a:r>
-              <a:rPr lang="ru-RU" dirty="0" smtClean="0"/>
-              <a:t/>
-            </a:r>
             <a:br>
               <a:rPr lang="ru-RU" dirty="0" smtClean="0"/>
             </a:br>
@@ -6846,8 +6863,8 @@
         </p:blipFill>
         <p:spPr>
           <a:xfrm>
-            <a:off x="228489" y="3658198"/>
-            <a:ext cx="3956569" cy="2964326"/>
+            <a:off x="539552" y="3391895"/>
+            <a:ext cx="3600000" cy="2697179"/>
           </a:xfrm>
         </p:spPr>
       </p:pic>
@@ -6859,7 +6876,7 @@
         </p:nvSpPr>
         <p:spPr>
           <a:xfrm>
-            <a:off x="4211960" y="4962360"/>
+            <a:off x="4234991" y="4562483"/>
             <a:ext cx="718721" cy="356002"/>
           </a:xfrm>
           <a:prstGeom prst="rightArrow">
@@ -6911,8 +6928,8 @@
         </p:blipFill>
         <p:spPr>
           <a:xfrm>
-            <a:off x="4957583" y="3658198"/>
-            <a:ext cx="3934528" cy="2957043"/>
+            <a:off x="5027079" y="3387672"/>
+            <a:ext cx="3600000" cy="2705624"/>
           </a:xfrm>
           <a:prstGeom prst="rect">
             <a:avLst/>
@@ -6929,7 +6946,7 @@
         </p:nvSpPr>
         <p:spPr>
           <a:xfrm>
-            <a:off x="457200" y="2060848"/>
+            <a:off x="457200" y="1988840"/>
             <a:ext cx="8229600" cy="1152127"/>
           </a:xfrm>
           <a:prstGeom prst="rect">
@@ -7080,14 +7097,27 @@
           <a:p>
             <a:r>
               <a:rPr lang="ru-RU" sz="3000" dirty="0" smtClean="0"/>
-              <a:t>Морфологическая обработка </a:t>
+              <a:t>Морфологическая </a:t>
+            </a:r>
+            <a:r>
+              <a:rPr lang="ru-RU" sz="3000" dirty="0" smtClean="0"/>
+              <a:t>обработка </a:t>
             </a:r>
             <a:endParaRPr lang="en-US" sz="3000" dirty="0" smtClean="0"/>
           </a:p>
           <a:p>
+            <a:pPr>
+              <a:spcBef>
+                <a:spcPts val="0"/>
+              </a:spcBef>
+            </a:pPr>
             <a:r>
               <a:rPr lang="ru-RU" sz="3000" dirty="0" smtClean="0"/>
-              <a:t>Вычисление выпуклых оболочек</a:t>
+              <a:t>Вычисление выпуклых </a:t>
+            </a:r>
+            <a:r>
+              <a:rPr lang="ru-RU" sz="3000" dirty="0" smtClean="0"/>
+              <a:t>оболочек</a:t>
             </a:r>
             <a:endParaRPr lang="ru-RU" sz="3000" dirty="0"/>
           </a:p>
@@ -7101,8 +7131,8 @@
         </p:nvSpPr>
         <p:spPr>
           <a:xfrm>
-            <a:off x="467544" y="1412776"/>
-            <a:ext cx="7128490" cy="584775"/>
+            <a:off x="467544" y="1484784"/>
+            <a:ext cx="7242304" cy="584775"/>
           </a:xfrm>
           <a:prstGeom prst="rect">
             <a:avLst/>
@@ -7116,14 +7146,14 @@
           <a:lstStyle/>
           <a:p>
             <a:r>
-              <a:rPr lang="ru-RU" sz="3200" dirty="0"/>
+              <a:rPr lang="ru-RU" sz="3200" b="1" dirty="0"/>
               <a:t>Повышение связности масок </a:t>
             </a:r>
             <a:r>
-              <a:rPr lang="ru-RU" sz="3200" dirty="0" smtClean="0"/>
+              <a:rPr lang="ru-RU" sz="3200" b="1" dirty="0" smtClean="0"/>
               <a:t>объектов:</a:t>
             </a:r>
-            <a:endParaRPr lang="ru-RU" sz="3200" dirty="0"/>
+            <a:endParaRPr lang="ru-RU" sz="3200" b="1" dirty="0"/>
           </a:p>
         </p:txBody>
       </p:sp>
@@ -7215,10 +7245,28 @@
           </a:bodyPr>
           <a:lstStyle/>
           <a:p>
+            <a:pPr>
+              <a:spcAft>
+                <a:spcPts val="600"/>
+              </a:spcAft>
+            </a:pPr>
+            <a:r>
+              <a:rPr lang="ru-RU" dirty="0"/>
+              <a:t>Начало слежения за </a:t>
+            </a:r>
             <a:r>
               <a:rPr lang="ru-RU" dirty="0" smtClean="0"/>
-              <a:t>Инициализация объектов происходит только в узкой полосе, перед чертой</a:t>
-            </a:r>
+              <a:t>объектом происходит </a:t>
+            </a:r>
+            <a:r>
+              <a:rPr lang="ru-RU" dirty="0" smtClean="0"/>
+              <a:t>только в узкой полосе, перед </a:t>
+            </a:r>
+            <a:r>
+              <a:rPr lang="ru-RU" dirty="0" smtClean="0"/>
+              <a:t>чертой.</a:t>
+            </a:r>
+            <a:endParaRPr lang="ru-RU" dirty="0" smtClean="0"/>
           </a:p>
           <a:p>
             <a:r>
@@ -7231,13 +7279,22 @@
             </a:r>
             <a:r>
               <a:rPr lang="ru-RU" dirty="0" smtClean="0"/>
-              <a:t>выполняется по ближайшему соседу</a:t>
-            </a:r>
-          </a:p>
-          <a:p>
+              <a:t>выполняется по ближайшему </a:t>
+            </a:r>
             <a:r>
               <a:rPr lang="ru-RU" dirty="0" smtClean="0"/>
-              <a:t>При пересечении объектом черты инкрементируется счетчик, слежение за этим объектом не продолжается</a:t>
+              <a:t>соседу.</a:t>
+            </a:r>
+            <a:endParaRPr lang="ru-RU" dirty="0" smtClean="0"/>
+          </a:p>
+          <a:p>
+            <a:r>
+              <a:rPr lang="ru-RU" dirty="0" smtClean="0"/>
+              <a:t>При пересечении объектом черты инкрементируется счетчик, слежение за этим объектом не </a:t>
+            </a:r>
+            <a:r>
+              <a:rPr lang="ru-RU" dirty="0" smtClean="0"/>
+              <a:t>продолжается.</a:t>
             </a:r>
             <a:endParaRPr lang="ru-RU" dirty="0" smtClean="0"/>
           </a:p>

</xml_diff>